<commit_message>
📝 docs: add report
</commit_message>
<xml_diff>
--- a/final_work/答辩PPT.pptx
+++ b/final_work/答辩PPT.pptx
@@ -227,7 +227,7 @@
             <a:fld id="{3CC73A6B-BB26-4B12-BFB8-2B873AE12267}" type="datetimeFigureOut">
               <a:rPr lang="zh-CN" altLang="en-US" smtClean="0"/>
               <a:pPr/>
-              <a:t>2019/4/24</a:t>
+              <a:t>2019/5/15</a:t>
             </a:fld>
             <a:endParaRPr lang="zh-CN" altLang="en-US" dirty="0"/>
           </a:p>
@@ -1068,26 +1068,7 @@
           <a:bodyPr/>
           <a:lstStyle/>
           <a:p>
-            <a:r>
-              <a:rPr lang="zh-CN" altLang="en-US" dirty="0"/>
-              <a:t>事先计算了每个</a:t>
-            </a:r>
-            <a:r>
-              <a:rPr lang="en-US" altLang="zh-CN" dirty="0"/>
-              <a:t>sector</a:t>
-            </a:r>
-            <a:r>
-              <a:rPr lang="zh-CN" altLang="en-US" dirty="0"/>
-              <a:t>每种频率下</a:t>
-            </a:r>
-            <a:r>
-              <a:rPr lang="en-US" altLang="zh-CN" dirty="0"/>
-              <a:t>RSS</a:t>
-            </a:r>
-            <a:r>
-              <a:rPr lang="zh-CN" altLang="en-US" dirty="0"/>
-              <a:t>的平均值，发现差不多</a:t>
-            </a:r>
+            <a:endParaRPr lang="zh-CN" altLang="en-US" dirty="0"/>
           </a:p>
         </p:txBody>
       </p:sp>
@@ -1171,26 +1152,7 @@
           <a:bodyPr/>
           <a:lstStyle/>
           <a:p>
-            <a:r>
-              <a:rPr lang="zh-CN" altLang="en-US" dirty="0"/>
-              <a:t>事先计算了每个</a:t>
-            </a:r>
-            <a:r>
-              <a:rPr lang="en-US" altLang="zh-CN" dirty="0"/>
-              <a:t>sector</a:t>
-            </a:r>
-            <a:r>
-              <a:rPr lang="zh-CN" altLang="en-US" dirty="0"/>
-              <a:t>每种频率下</a:t>
-            </a:r>
-            <a:r>
-              <a:rPr lang="en-US" altLang="zh-CN" dirty="0"/>
-              <a:t>RSS</a:t>
-            </a:r>
-            <a:r>
-              <a:rPr lang="zh-CN" altLang="en-US" dirty="0"/>
-              <a:t>的平均值，发现差不多</a:t>
-            </a:r>
+            <a:endParaRPr lang="zh-CN" altLang="en-US" dirty="0"/>
           </a:p>
         </p:txBody>
       </p:sp>
@@ -1364,7 +1326,7 @@
             </a:r>
             <a:r>
               <a:rPr lang="zh-CN" altLang="en-US" dirty="0"/>
-              <a:t>与定位这个应用场景比较吻合，确定是预测时间复杂度和训练集成正比</a:t>
+              <a:t>与定位这个应用场景比较吻合，缺点是预测时间复杂度和训练集大小成正比</a:t>
             </a:r>
             <a:endParaRPr lang="en-US" altLang="zh-CN" dirty="0"/>
           </a:p>
@@ -1559,7 +1521,7 @@
           <a:p>
             <a:fld id="{F86BAB08-D03A-4FEF-8092-001CB785BBAB}" type="datetimeFigureOut">
               <a:rPr lang="zh-CN" altLang="en-US" smtClean="0"/>
-              <a:t>2019/4/24</a:t>
+              <a:t>2019/5/15</a:t>
             </a:fld>
             <a:endParaRPr lang="zh-CN" altLang="en-US"/>
           </a:p>
@@ -1760,7 +1722,7 @@
           <a:p>
             <a:fld id="{F86BAB08-D03A-4FEF-8092-001CB785BBAB}" type="datetimeFigureOut">
               <a:rPr lang="zh-CN" altLang="en-US" smtClean="0"/>
-              <a:t>2019/4/24</a:t>
+              <a:t>2019/5/15</a:t>
             </a:fld>
             <a:endParaRPr lang="zh-CN" altLang="en-US"/>
           </a:p>
@@ -1971,7 +1933,7 @@
           <a:p>
             <a:fld id="{F86BAB08-D03A-4FEF-8092-001CB785BBAB}" type="datetimeFigureOut">
               <a:rPr lang="zh-CN" altLang="en-US" smtClean="0"/>
-              <a:t>2019/4/24</a:t>
+              <a:t>2019/5/15</a:t>
             </a:fld>
             <a:endParaRPr lang="zh-CN" altLang="en-US"/>
           </a:p>
@@ -2172,7 +2134,7 @@
           <a:p>
             <a:fld id="{F86BAB08-D03A-4FEF-8092-001CB785BBAB}" type="datetimeFigureOut">
               <a:rPr lang="zh-CN" altLang="en-US" smtClean="0"/>
-              <a:t>2019/4/24</a:t>
+              <a:t>2019/5/15</a:t>
             </a:fld>
             <a:endParaRPr lang="zh-CN" altLang="en-US"/>
           </a:p>
@@ -2450,7 +2412,7 @@
           <a:p>
             <a:fld id="{F86BAB08-D03A-4FEF-8092-001CB785BBAB}" type="datetimeFigureOut">
               <a:rPr lang="zh-CN" altLang="en-US" smtClean="0"/>
-              <a:t>2019/4/24</a:t>
+              <a:t>2019/5/15</a:t>
             </a:fld>
             <a:endParaRPr lang="zh-CN" altLang="en-US"/>
           </a:p>
@@ -2718,7 +2680,7 @@
           <a:p>
             <a:fld id="{F86BAB08-D03A-4FEF-8092-001CB785BBAB}" type="datetimeFigureOut">
               <a:rPr lang="zh-CN" altLang="en-US" smtClean="0"/>
-              <a:t>2019/4/24</a:t>
+              <a:t>2019/5/15</a:t>
             </a:fld>
             <a:endParaRPr lang="zh-CN" altLang="en-US"/>
           </a:p>
@@ -3133,7 +3095,7 @@
           <a:p>
             <a:fld id="{F86BAB08-D03A-4FEF-8092-001CB785BBAB}" type="datetimeFigureOut">
               <a:rPr lang="zh-CN" altLang="en-US" smtClean="0"/>
-              <a:t>2019/4/24</a:t>
+              <a:t>2019/5/15</a:t>
             </a:fld>
             <a:endParaRPr lang="zh-CN" altLang="en-US"/>
           </a:p>
@@ -3277,7 +3239,7 @@
           <a:p>
             <a:fld id="{F86BAB08-D03A-4FEF-8092-001CB785BBAB}" type="datetimeFigureOut">
               <a:rPr lang="zh-CN" altLang="en-US" smtClean="0"/>
-              <a:t>2019/4/24</a:t>
+              <a:t>2019/5/15</a:t>
             </a:fld>
             <a:endParaRPr lang="zh-CN" altLang="en-US"/>
           </a:p>
@@ -3393,7 +3355,7 @@
           <a:p>
             <a:fld id="{F86BAB08-D03A-4FEF-8092-001CB785BBAB}" type="datetimeFigureOut">
               <a:rPr lang="zh-CN" altLang="en-US" smtClean="0"/>
-              <a:t>2019/4/24</a:t>
+              <a:t>2019/5/15</a:t>
             </a:fld>
             <a:endParaRPr lang="zh-CN" altLang="en-US"/>
           </a:p>
@@ -3707,7 +3669,7 @@
           <a:p>
             <a:fld id="{F86BAB08-D03A-4FEF-8092-001CB785BBAB}" type="datetimeFigureOut">
               <a:rPr lang="zh-CN" altLang="en-US" smtClean="0"/>
-              <a:t>2019/4/24</a:t>
+              <a:t>2019/5/15</a:t>
             </a:fld>
             <a:endParaRPr lang="zh-CN" altLang="en-US"/>
           </a:p>
@@ -3998,7 +3960,7 @@
           <a:p>
             <a:fld id="{F86BAB08-D03A-4FEF-8092-001CB785BBAB}" type="datetimeFigureOut">
               <a:rPr lang="zh-CN" altLang="en-US" smtClean="0"/>
-              <a:t>2019/4/24</a:t>
+              <a:t>2019/5/15</a:t>
             </a:fld>
             <a:endParaRPr lang="zh-CN" altLang="en-US"/>
           </a:p>
@@ -4248,7 +4210,7 @@
             <a:fld id="{F86BAB08-D03A-4FEF-8092-001CB785BBAB}" type="datetimeFigureOut">
               <a:rPr lang="zh-CN" altLang="en-US" smtClean="0"/>
               <a:pPr/>
-              <a:t>2019/4/24</a:t>
+              <a:t>2019/5/15</a:t>
             </a:fld>
             <a:endParaRPr lang="zh-CN" altLang="en-US" dirty="0"/>
           </a:p>
@@ -6498,8 +6460,8 @@
   <p:transition spd="slow">
     <p:push dir="u"/>
   </p:transition>
-  <mc:AlternateContent xmlns:mc="http://schemas.openxmlformats.org/markup-compatibility/2006">
-    <mc:Choice xmlns:p14="http://schemas.microsoft.com/office/powerpoint/2010/main" Requires="p14">
+  <mc:AlternateContent xmlns:mc="http://schemas.openxmlformats.org/markup-compatibility/2006" xmlns:p14="http://schemas.microsoft.com/office/powerpoint/2010/main">
+    <mc:Choice Requires="p14">
       <p:timing>
         <p:tnLst>
           <p:par>
@@ -7025,7 +6987,7 @@
         </p:bldLst>
       </p:timing>
     </mc:Choice>
-    <mc:Fallback>
+    <mc:Fallback xmlns="">
       <p:timing>
         <p:tnLst>
           <p:par>
@@ -11256,8 +11218,8 @@
   <p:transition spd="slow">
     <p:push dir="u"/>
   </p:transition>
-  <mc:AlternateContent xmlns:mc="http://schemas.openxmlformats.org/markup-compatibility/2006">
-    <mc:Choice xmlns:p14="http://schemas.microsoft.com/office/powerpoint/2010/main" Requires="p14">
+  <mc:AlternateContent xmlns:mc="http://schemas.openxmlformats.org/markup-compatibility/2006" xmlns:p14="http://schemas.microsoft.com/office/powerpoint/2010/main">
+    <mc:Choice Requires="p14">
       <p:timing>
         <p:tnLst>
           <p:par>
@@ -11783,7 +11745,7 @@
         </p:bldLst>
       </p:timing>
     </mc:Choice>
-    <mc:Fallback>
+    <mc:Fallback xmlns="">
       <p:timing>
         <p:tnLst>
           <p:par>
@@ -14463,7 +14425,7 @@
         </p:blipFill>
         <p:spPr>
           <a:xfrm>
-            <a:off x="3118158" y="1844008"/>
+            <a:off x="2534457" y="2015756"/>
             <a:ext cx="4744489" cy="3558367"/>
           </a:xfrm>
           <a:prstGeom prst="rect">
@@ -19778,8 +19740,8 @@
   <p:transition spd="slow">
     <p:push dir="u"/>
   </p:transition>
-  <mc:AlternateContent xmlns:mc="http://schemas.openxmlformats.org/markup-compatibility/2006">
-    <mc:Choice xmlns:p14="http://schemas.microsoft.com/office/powerpoint/2010/main" Requires="p14">
+  <mc:AlternateContent xmlns:mc="http://schemas.openxmlformats.org/markup-compatibility/2006" xmlns:p14="http://schemas.microsoft.com/office/powerpoint/2010/main">
+    <mc:Choice Requires="p14">
       <p:timing>
         <p:tnLst>
           <p:par>
@@ -20031,7 +19993,7 @@
         </p:tnLst>
       </p:timing>
     </mc:Choice>
-    <mc:Fallback>
+    <mc:Fallback xmlns="">
       <p:timing>
         <p:tnLst>
           <p:par>

</xml_diff>